<commit_message>
Added presentation and a demo video
</commit_message>
<xml_diff>
--- a/Visual Analytics U7 Presentation.pptx
+++ b/Visual Analytics U7 Presentation.pptx
@@ -8,6 +8,8 @@
     <p:sldId id="256" r:id="rId2"/>
     <p:sldId id="258" r:id="rId3"/>
     <p:sldId id="257" r:id="rId4"/>
+    <p:sldId id="259" r:id="rId5"/>
+    <p:sldId id="260" r:id="rId6"/>
   </p:sldIdLst>
   <p:sldSz cx="12192000" cy="6858000"/>
   <p:notesSz cx="6858000" cy="9144000"/>
@@ -106,7 +108,184 @@
       </a:defRPr>
     </a:lvl9pPr>
   </p:defaultTextStyle>
+  <p:extLst>
+    <p:ext uri="{EFAFB233-063F-42B5-8137-9DF3F51BA10A}">
+      <p15:sldGuideLst xmlns:p15="http://schemas.microsoft.com/office/powerpoint/2012/main"/>
+    </p:ext>
+  </p:extLst>
 </p:presentation>
+</file>
+
+<file path=ppt/revisionInfo.xml><?xml version="1.0" encoding="utf-8"?>
+<p1510:revInfo xmlns:a="http://schemas.openxmlformats.org/drawingml/2006/main" xmlns:r="http://schemas.openxmlformats.org/officeDocument/2006/relationships" xmlns:p1510="http://schemas.microsoft.com/office/powerpoint/2015/10/main">
+  <p1510:revLst>
+    <p1510:client id="{1692F0B7-C85D-4853-8385-C3B1AD3AB2F6}" v="8" dt="2019-12-04T14:05:11.962"/>
+  </p1510:revLst>
+</p1510:revInfo>
+</file>
+
+<file path=ppt/changesInfos/changesInfo1.xml><?xml version="1.0" encoding="utf-8"?>
+<pc:chgInfo xmlns:a="http://schemas.openxmlformats.org/drawingml/2006/main" xmlns:r="http://schemas.openxmlformats.org/officeDocument/2006/relationships" xmlns:ac="http://schemas.microsoft.com/office/drawing/2013/main/command" xmlns:pc="http://schemas.microsoft.com/office/powerpoint/2013/main/command">
+  <pc:docChgLst>
+    <pc:chgData name="Ellis Thompson" userId="03716a9367dae0e4" providerId="LiveId" clId="{1692F0B7-C85D-4853-8385-C3B1AD3AB2F6}"/>
+    <pc:docChg chg="custSel mod addSld modSld">
+      <pc:chgData name="Ellis Thompson" userId="03716a9367dae0e4" providerId="LiveId" clId="{1692F0B7-C85D-4853-8385-C3B1AD3AB2F6}" dt="2019-12-04T14:06:39.476" v="458" actId="5793"/>
+      <pc:docMkLst>
+        <pc:docMk/>
+      </pc:docMkLst>
+      <pc:sldChg chg="addSp delSp modSp add mod setBg modAnim setClrOvrMap">
+        <pc:chgData name="Ellis Thompson" userId="03716a9367dae0e4" providerId="LiveId" clId="{1692F0B7-C85D-4853-8385-C3B1AD3AB2F6}" dt="2019-12-04T13:59:07.089" v="215" actId="5793"/>
+        <pc:sldMkLst>
+          <pc:docMk/>
+          <pc:sldMk cId="3879322090" sldId="259"/>
+        </pc:sldMkLst>
+        <pc:spChg chg="mod">
+          <ac:chgData name="Ellis Thompson" userId="03716a9367dae0e4" providerId="LiveId" clId="{1692F0B7-C85D-4853-8385-C3B1AD3AB2F6}" dt="2019-12-04T13:53:08.558" v="19" actId="26606"/>
+          <ac:spMkLst>
+            <pc:docMk/>
+            <pc:sldMk cId="3879322090" sldId="259"/>
+            <ac:spMk id="2" creationId="{C7160F62-AFFD-479F-B268-52AA632E7798}"/>
+          </ac:spMkLst>
+        </pc:spChg>
+        <pc:spChg chg="del mod">
+          <ac:chgData name="Ellis Thompson" userId="03716a9367dae0e4" providerId="LiveId" clId="{1692F0B7-C85D-4853-8385-C3B1AD3AB2F6}" dt="2019-12-04T13:49:39.450" v="2"/>
+          <ac:spMkLst>
+            <pc:docMk/>
+            <pc:sldMk cId="3879322090" sldId="259"/>
+            <ac:spMk id="3" creationId="{A94BF77A-C1E4-496E-92A5-BA4D5C843431}"/>
+          </ac:spMkLst>
+        </pc:spChg>
+        <pc:spChg chg="add del mod">
+          <ac:chgData name="Ellis Thompson" userId="03716a9367dae0e4" providerId="LiveId" clId="{1692F0B7-C85D-4853-8385-C3B1AD3AB2F6}" dt="2019-12-04T13:54:15.916" v="65"/>
+          <ac:spMkLst>
+            <pc:docMk/>
+            <pc:sldMk cId="3879322090" sldId="259"/>
+            <ac:spMk id="5" creationId="{34AF63F8-5B86-40FA-A6EF-F40E2CCC279E}"/>
+          </ac:spMkLst>
+        </pc:spChg>
+        <pc:spChg chg="add del">
+          <ac:chgData name="Ellis Thompson" userId="03716a9367dae0e4" providerId="LiveId" clId="{1692F0B7-C85D-4853-8385-C3B1AD3AB2F6}" dt="2019-12-04T13:53:08.558" v="19" actId="26606"/>
+          <ac:spMkLst>
+            <pc:docMk/>
+            <pc:sldMk cId="3879322090" sldId="259"/>
+            <ac:spMk id="8" creationId="{1C3D9BD5-A493-4B97-963D-60135D533822}"/>
+          </ac:spMkLst>
+        </pc:spChg>
+        <pc:spChg chg="add del">
+          <ac:chgData name="Ellis Thompson" userId="03716a9367dae0e4" providerId="LiveId" clId="{1692F0B7-C85D-4853-8385-C3B1AD3AB2F6}" dt="2019-12-04T13:53:08.558" v="19" actId="26606"/>
+          <ac:spMkLst>
+            <pc:docMk/>
+            <pc:sldMk cId="3879322090" sldId="259"/>
+            <ac:spMk id="10" creationId="{1F759AF4-E342-4E60-8A32-C44A328F2F42}"/>
+          </ac:spMkLst>
+        </pc:spChg>
+        <pc:spChg chg="add mod">
+          <ac:chgData name="Ellis Thompson" userId="03716a9367dae0e4" providerId="LiveId" clId="{1692F0B7-C85D-4853-8385-C3B1AD3AB2F6}" dt="2019-12-04T13:59:07.089" v="215" actId="5793"/>
+          <ac:spMkLst>
+            <pc:docMk/>
+            <pc:sldMk cId="3879322090" sldId="259"/>
+            <ac:spMk id="16" creationId="{BF2153B8-A796-478E-8ADA-8CC5F6DCDF13}"/>
+          </ac:spMkLst>
+        </pc:spChg>
+        <pc:spChg chg="add del">
+          <ac:chgData name="Ellis Thompson" userId="03716a9367dae0e4" providerId="LiveId" clId="{1692F0B7-C85D-4853-8385-C3B1AD3AB2F6}" dt="2019-12-04T13:54:25.928" v="66" actId="26606"/>
+          <ac:spMkLst>
+            <pc:docMk/>
+            <pc:sldMk cId="3879322090" sldId="259"/>
+            <ac:spMk id="19" creationId="{A98FD4FC-479A-4C2B-84A5-CF81E055FBC0}"/>
+          </ac:spMkLst>
+        </pc:spChg>
+        <pc:spChg chg="add del">
+          <ac:chgData name="Ellis Thompson" userId="03716a9367dae0e4" providerId="LiveId" clId="{1692F0B7-C85D-4853-8385-C3B1AD3AB2F6}" dt="2019-12-04T13:54:25.928" v="66" actId="26606"/>
+          <ac:spMkLst>
+            <pc:docMk/>
+            <pc:sldMk cId="3879322090" sldId="259"/>
+            <ac:spMk id="21" creationId="{37D54B6C-87D0-4C03-8335-3955179D2B5B}"/>
+          </ac:spMkLst>
+        </pc:spChg>
+        <pc:spChg chg="add">
+          <ac:chgData name="Ellis Thompson" userId="03716a9367dae0e4" providerId="LiveId" clId="{1692F0B7-C85D-4853-8385-C3B1AD3AB2F6}" dt="2019-12-04T13:54:25.928" v="66" actId="26606"/>
+          <ac:spMkLst>
+            <pc:docMk/>
+            <pc:sldMk cId="3879322090" sldId="259"/>
+            <ac:spMk id="26" creationId="{A98FD4FC-479A-4C2B-84A5-CF81E055FBC0}"/>
+          </ac:spMkLst>
+        </pc:spChg>
+        <pc:spChg chg="add">
+          <ac:chgData name="Ellis Thompson" userId="03716a9367dae0e4" providerId="LiveId" clId="{1692F0B7-C85D-4853-8385-C3B1AD3AB2F6}" dt="2019-12-04T13:54:25.928" v="66" actId="26606"/>
+          <ac:spMkLst>
+            <pc:docMk/>
+            <pc:sldMk cId="3879322090" sldId="259"/>
+            <ac:spMk id="28" creationId="{37D54B6C-87D0-4C03-8335-3955179D2B5B}"/>
+          </ac:spMkLst>
+        </pc:spChg>
+        <pc:picChg chg="add mod">
+          <ac:chgData name="Ellis Thompson" userId="03716a9367dae0e4" providerId="LiveId" clId="{1692F0B7-C85D-4853-8385-C3B1AD3AB2F6}" dt="2019-12-04T13:53:08.558" v="19" actId="26606"/>
+          <ac:picMkLst>
+            <pc:docMk/>
+            <pc:sldMk cId="3879322090" sldId="259"/>
+            <ac:picMk id="4" creationId="{59C9559E-1707-4400-91C0-A27494284183}"/>
+          </ac:picMkLst>
+        </pc:picChg>
+        <pc:cxnChg chg="add del">
+          <ac:chgData name="Ellis Thompson" userId="03716a9367dae0e4" providerId="LiveId" clId="{1692F0B7-C85D-4853-8385-C3B1AD3AB2F6}" dt="2019-12-04T13:53:08.558" v="19" actId="26606"/>
+          <ac:cxnSpMkLst>
+            <pc:docMk/>
+            <pc:sldMk cId="3879322090" sldId="259"/>
+            <ac:cxnSpMk id="12" creationId="{A49B2805-6469-407A-A68A-BB85AC8A8596}"/>
+          </ac:cxnSpMkLst>
+        </pc:cxnChg>
+      </pc:sldChg>
+      <pc:sldChg chg="addSp modSp add mod setBg setClrOvrMap">
+        <pc:chgData name="Ellis Thompson" userId="03716a9367dae0e4" providerId="LiveId" clId="{1692F0B7-C85D-4853-8385-C3B1AD3AB2F6}" dt="2019-12-04T14:06:39.476" v="458" actId="5793"/>
+        <pc:sldMkLst>
+          <pc:docMk/>
+          <pc:sldMk cId="4143311138" sldId="260"/>
+        </pc:sldMkLst>
+        <pc:spChg chg="mod">
+          <ac:chgData name="Ellis Thompson" userId="03716a9367dae0e4" providerId="LiveId" clId="{1692F0B7-C85D-4853-8385-C3B1AD3AB2F6}" dt="2019-12-04T14:05:20.360" v="227" actId="26606"/>
+          <ac:spMkLst>
+            <pc:docMk/>
+            <pc:sldMk cId="4143311138" sldId="260"/>
+            <ac:spMk id="2" creationId="{A9CF7386-C6BD-4939-AB19-FF4442B079C3}"/>
+          </ac:spMkLst>
+        </pc:spChg>
+        <pc:spChg chg="mod">
+          <ac:chgData name="Ellis Thompson" userId="03716a9367dae0e4" providerId="LiveId" clId="{1692F0B7-C85D-4853-8385-C3B1AD3AB2F6}" dt="2019-12-04T14:06:39.476" v="458" actId="5793"/>
+          <ac:spMkLst>
+            <pc:docMk/>
+            <pc:sldMk cId="4143311138" sldId="260"/>
+            <ac:spMk id="3" creationId="{3FD5AFFE-5AD3-4734-B407-91C80BD6B4E1}"/>
+          </ac:spMkLst>
+        </pc:spChg>
+        <pc:spChg chg="add">
+          <ac:chgData name="Ellis Thompson" userId="03716a9367dae0e4" providerId="LiveId" clId="{1692F0B7-C85D-4853-8385-C3B1AD3AB2F6}" dt="2019-12-04T14:05:20.360" v="227" actId="26606"/>
+          <ac:spMkLst>
+            <pc:docMk/>
+            <pc:sldMk cId="4143311138" sldId="260"/>
+            <ac:spMk id="8" creationId="{1C3D9BD5-A493-4B97-963D-60135D533822}"/>
+          </ac:spMkLst>
+        </pc:spChg>
+        <pc:spChg chg="add">
+          <ac:chgData name="Ellis Thompson" userId="03716a9367dae0e4" providerId="LiveId" clId="{1692F0B7-C85D-4853-8385-C3B1AD3AB2F6}" dt="2019-12-04T14:05:20.360" v="227" actId="26606"/>
+          <ac:spMkLst>
+            <pc:docMk/>
+            <pc:sldMk cId="4143311138" sldId="260"/>
+            <ac:spMk id="10" creationId="{1F759AF4-E342-4E60-8A32-C44A328F2F42}"/>
+          </ac:spMkLst>
+        </pc:spChg>
+        <pc:cxnChg chg="add">
+          <ac:chgData name="Ellis Thompson" userId="03716a9367dae0e4" providerId="LiveId" clId="{1692F0B7-C85D-4853-8385-C3B1AD3AB2F6}" dt="2019-12-04T14:05:20.360" v="227" actId="26606"/>
+          <ac:cxnSpMkLst>
+            <pc:docMk/>
+            <pc:sldMk cId="4143311138" sldId="260"/>
+            <ac:cxnSpMk id="12" creationId="{A49B2805-6469-407A-A68A-BB85AC8A8596}"/>
+          </ac:cxnSpMkLst>
+        </pc:cxnChg>
+      </pc:sldChg>
+    </pc:docChg>
+  </pc:docChgLst>
+</pc:chgInfo>
 </file>
 
 <file path=ppt/diagrams/colors1.xml><?xml version="1.0" encoding="utf-8"?>
@@ -10186,6 +10365,895 @@
 </p:sld>
 </file>
 
+<file path=ppt/slides/slide4.xml><?xml version="1.0" encoding="utf-8"?>
+<p:sld xmlns:a="http://schemas.openxmlformats.org/drawingml/2006/main" xmlns:r="http://schemas.openxmlformats.org/officeDocument/2006/relationships" xmlns:p="http://schemas.openxmlformats.org/presentationml/2006/main">
+  <p:cSld>
+    <p:bg>
+      <p:bgPr>
+        <a:blipFill rotWithShape="1">
+          <a:blip r:embed="rId4">
+            <a:duotone>
+              <a:schemeClr val="bg1">
+                <a:shade val="80000"/>
+                <a:lumMod val="80000"/>
+              </a:schemeClr>
+              <a:schemeClr val="bg1">
+                <a:tint val="98000"/>
+              </a:schemeClr>
+            </a:duotone>
+          </a:blip>
+          <a:stretch/>
+        </a:blipFill>
+        <a:effectLst/>
+      </p:bgPr>
+    </p:bg>
+    <p:spTree>
+      <p:nvGrpSpPr>
+        <p:cNvPr id="1" name=""/>
+        <p:cNvGrpSpPr/>
+        <p:nvPr/>
+      </p:nvGrpSpPr>
+      <p:grpSpPr>
+        <a:xfrm>
+          <a:off x="0" y="0"/>
+          <a:ext cx="0" cy="0"/>
+          <a:chOff x="0" y="0"/>
+          <a:chExt cx="0" cy="0"/>
+        </a:xfrm>
+      </p:grpSpPr>
+      <p:sp>
+        <p:nvSpPr>
+          <p:cNvPr id="26" name="Rectangle 25">
+            <a:extLst>
+              <a:ext uri="{FF2B5EF4-FFF2-40B4-BE49-F238E27FC236}">
+                <a16:creationId xmlns:a16="http://schemas.microsoft.com/office/drawing/2014/main" id="{A98FD4FC-479A-4C2B-84A5-CF81E055FBC0}"/>
+              </a:ext>
+              <a:ext uri="{C183D7F6-B498-43B3-948B-1728B52AA6E4}">
+                <adec:decorative xmlns:adec="http://schemas.microsoft.com/office/drawing/2017/decorative" val="1"/>
+              </a:ext>
+            </a:extLst>
+          </p:cNvPr>
+          <p:cNvSpPr>
+            <a:spLocks noGrp="1" noRot="1" noChangeAspect="1" noMove="1" noResize="1" noEditPoints="1" noAdjustHandles="1" noChangeArrowheads="1" noChangeShapeType="1" noTextEdit="1"/>
+          </p:cNvSpPr>
+          <p:nvPr>
+            <p:extLst>
+              <p:ext uri="{386F3935-93C4-4BCD-93E2-E3B085C9AB24}">
+                <p16:designElem xmlns:p16="http://schemas.microsoft.com/office/powerpoint/2015/main" val="1"/>
+              </p:ext>
+            </p:extLst>
+          </p:nvPr>
+        </p:nvSpPr>
+        <p:spPr>
+          <a:xfrm>
+            <a:off x="0" y="0"/>
+            <a:ext cx="12192000" cy="6858000"/>
+          </a:xfrm>
+          <a:prstGeom prst="rect">
+            <a:avLst/>
+          </a:prstGeom>
+          <a:solidFill>
+            <a:srgbClr val="FFFFFF"/>
+          </a:solidFill>
+          <a:ln>
+            <a:noFill/>
+          </a:ln>
+        </p:spPr>
+        <p:style>
+          <a:lnRef idx="2">
+            <a:schemeClr val="accent1">
+              <a:shade val="50000"/>
+            </a:schemeClr>
+          </a:lnRef>
+          <a:fillRef idx="1">
+            <a:schemeClr val="accent1"/>
+          </a:fillRef>
+          <a:effectRef idx="0">
+            <a:schemeClr val="accent1"/>
+          </a:effectRef>
+          <a:fontRef idx="minor">
+            <a:schemeClr val="lt1"/>
+          </a:fontRef>
+        </p:style>
+        <p:txBody>
+          <a:bodyPr rtlCol="0" anchor="ctr"/>
+          <a:lstStyle/>
+          <a:p>
+            <a:pPr algn="ctr"/>
+            <a:endParaRPr lang="en-US"/>
+          </a:p>
+        </p:txBody>
+      </p:sp>
+      <p:sp useBgFill="1">
+        <p:nvSpPr>
+          <p:cNvPr id="28" name="Freeform 5">
+            <a:extLst>
+              <a:ext uri="{FF2B5EF4-FFF2-40B4-BE49-F238E27FC236}">
+                <a16:creationId xmlns:a16="http://schemas.microsoft.com/office/drawing/2014/main" id="{37D54B6C-87D0-4C03-8335-3955179D2B5B}"/>
+              </a:ext>
+              <a:ext uri="{C183D7F6-B498-43B3-948B-1728B52AA6E4}">
+                <adec:decorative xmlns:adec="http://schemas.microsoft.com/office/drawing/2017/decorative" val="1"/>
+              </a:ext>
+            </a:extLst>
+          </p:cNvPr>
+          <p:cNvSpPr>
+            <a:spLocks noGrp="1" noRot="1" noChangeAspect="1" noMove="1" noResize="1" noEditPoints="1" noAdjustHandles="1" noChangeArrowheads="1" noChangeShapeType="1" noTextEdit="1"/>
+          </p:cNvSpPr>
+          <p:nvPr>
+            <p:extLst>
+              <p:ext uri="{386F3935-93C4-4BCD-93E2-E3B085C9AB24}">
+                <p16:designElem xmlns:p16="http://schemas.microsoft.com/office/powerpoint/2015/main" val="1"/>
+              </p:ext>
+            </p:extLst>
+          </p:nvPr>
+        </p:nvSpPr>
+        <p:spPr bwMode="auto">
+          <a:xfrm rot="5400000">
+            <a:off x="-118536" y="1371603"/>
+            <a:ext cx="5624423" cy="4100418"/>
+          </a:xfrm>
+          <a:custGeom>
+            <a:avLst/>
+            <a:gdLst>
+              <a:gd name="T0" fmla="*/ 1577 w 1601"/>
+              <a:gd name="T1" fmla="*/ 0 h 696"/>
+              <a:gd name="T2" fmla="*/ 833 w 1601"/>
+              <a:gd name="T3" fmla="*/ 0 h 696"/>
+              <a:gd name="T4" fmla="*/ 768 w 1601"/>
+              <a:gd name="T5" fmla="*/ 0 h 696"/>
+              <a:gd name="T6" fmla="*/ 24 w 1601"/>
+              <a:gd name="T7" fmla="*/ 0 h 696"/>
+              <a:gd name="T8" fmla="*/ 0 w 1601"/>
+              <a:gd name="T9" fmla="*/ 27 h 696"/>
+              <a:gd name="T10" fmla="*/ 0 w 1601"/>
+              <a:gd name="T11" fmla="*/ 669 h 696"/>
+              <a:gd name="T12" fmla="*/ 24 w 1601"/>
+              <a:gd name="T13" fmla="*/ 696 h 696"/>
+              <a:gd name="T14" fmla="*/ 768 w 1601"/>
+              <a:gd name="T15" fmla="*/ 696 h 696"/>
+              <a:gd name="T16" fmla="*/ 833 w 1601"/>
+              <a:gd name="T17" fmla="*/ 696 h 696"/>
+              <a:gd name="T18" fmla="*/ 1577 w 1601"/>
+              <a:gd name="T19" fmla="*/ 696 h 696"/>
+              <a:gd name="T20" fmla="*/ 1601 w 1601"/>
+              <a:gd name="T21" fmla="*/ 669 h 696"/>
+              <a:gd name="T22" fmla="*/ 1601 w 1601"/>
+              <a:gd name="T23" fmla="*/ 27 h 696"/>
+              <a:gd name="T24" fmla="*/ 1577 w 1601"/>
+              <a:gd name="T25" fmla="*/ 0 h 696"/>
+            </a:gdLst>
+            <a:ahLst/>
+            <a:cxnLst>
+              <a:cxn ang="0">
+                <a:pos x="T0" y="T1"/>
+              </a:cxn>
+              <a:cxn ang="0">
+                <a:pos x="T2" y="T3"/>
+              </a:cxn>
+              <a:cxn ang="0">
+                <a:pos x="T4" y="T5"/>
+              </a:cxn>
+              <a:cxn ang="0">
+                <a:pos x="T6" y="T7"/>
+              </a:cxn>
+              <a:cxn ang="0">
+                <a:pos x="T8" y="T9"/>
+              </a:cxn>
+              <a:cxn ang="0">
+                <a:pos x="T10" y="T11"/>
+              </a:cxn>
+              <a:cxn ang="0">
+                <a:pos x="T12" y="T13"/>
+              </a:cxn>
+              <a:cxn ang="0">
+                <a:pos x="T14" y="T15"/>
+              </a:cxn>
+              <a:cxn ang="0">
+                <a:pos x="T16" y="T17"/>
+              </a:cxn>
+              <a:cxn ang="0">
+                <a:pos x="T18" y="T19"/>
+              </a:cxn>
+              <a:cxn ang="0">
+                <a:pos x="T20" y="T21"/>
+              </a:cxn>
+              <a:cxn ang="0">
+                <a:pos x="T22" y="T23"/>
+              </a:cxn>
+              <a:cxn ang="0">
+                <a:pos x="T24" y="T25"/>
+              </a:cxn>
+            </a:cxnLst>
+            <a:rect l="0" t="0" r="r" b="b"/>
+            <a:pathLst>
+              <a:path w="1601" h="696">
+                <a:moveTo>
+                  <a:pt x="1577" y="0"/>
+                </a:moveTo>
+                <a:cubicBezTo>
+                  <a:pt x="833" y="0"/>
+                  <a:pt x="833" y="0"/>
+                  <a:pt x="833" y="0"/>
+                </a:cubicBezTo>
+                <a:cubicBezTo>
+                  <a:pt x="768" y="0"/>
+                  <a:pt x="768" y="0"/>
+                  <a:pt x="768" y="0"/>
+                </a:cubicBezTo>
+                <a:cubicBezTo>
+                  <a:pt x="24" y="0"/>
+                  <a:pt x="24" y="0"/>
+                  <a:pt x="24" y="0"/>
+                </a:cubicBezTo>
+                <a:cubicBezTo>
+                  <a:pt x="11" y="0"/>
+                  <a:pt x="0" y="12"/>
+                  <a:pt x="0" y="27"/>
+                </a:cubicBezTo>
+                <a:cubicBezTo>
+                  <a:pt x="0" y="669"/>
+                  <a:pt x="0" y="669"/>
+                  <a:pt x="0" y="669"/>
+                </a:cubicBezTo>
+                <a:cubicBezTo>
+                  <a:pt x="0" y="684"/>
+                  <a:pt x="11" y="696"/>
+                  <a:pt x="24" y="696"/>
+                </a:cubicBezTo>
+                <a:cubicBezTo>
+                  <a:pt x="768" y="696"/>
+                  <a:pt x="768" y="696"/>
+                  <a:pt x="768" y="696"/>
+                </a:cubicBezTo>
+                <a:cubicBezTo>
+                  <a:pt x="833" y="696"/>
+                  <a:pt x="833" y="696"/>
+                  <a:pt x="833" y="696"/>
+                </a:cubicBezTo>
+                <a:cubicBezTo>
+                  <a:pt x="1577" y="696"/>
+                  <a:pt x="1577" y="696"/>
+                  <a:pt x="1577" y="696"/>
+                </a:cubicBezTo>
+                <a:cubicBezTo>
+                  <a:pt x="1590" y="696"/>
+                  <a:pt x="1601" y="684"/>
+                  <a:pt x="1601" y="669"/>
+                </a:cubicBezTo>
+                <a:cubicBezTo>
+                  <a:pt x="1601" y="27"/>
+                  <a:pt x="1601" y="27"/>
+                  <a:pt x="1601" y="27"/>
+                </a:cubicBezTo>
+                <a:cubicBezTo>
+                  <a:pt x="1601" y="12"/>
+                  <a:pt x="1590" y="0"/>
+                  <a:pt x="1577" y="0"/>
+                </a:cubicBezTo>
+                <a:close/>
+              </a:path>
+            </a:pathLst>
+          </a:custGeom>
+          <a:ln>
+            <a:noFill/>
+          </a:ln>
+          <a:effectLst>
+            <a:outerShdw blurRad="50800" dist="38100" dir="5400000" algn="tl" rotWithShape="0">
+              <a:srgbClr val="000000">
+                <a:alpha val="43000"/>
+              </a:srgbClr>
+            </a:outerShdw>
+          </a:effectLst>
+          <a:extLst>
+            <a:ext uri="{91240B29-F687-4f45-9708-019B960494DF}">
+              <a14:hiddenLine xmlns="" xmlns:a16="http://schemas.microsoft.com/office/drawing/2014/main" xmlns:p14="http://schemas.microsoft.com/office/powerpoint/2010/main" xmlns:a14="http://schemas.microsoft.com/office/drawing/2010/main" w="9525">
+                <a:solidFill>
+                  <a:srgbClr val="000000"/>
+                </a:solidFill>
+                <a:round/>
+                <a:headEnd/>
+                <a:tailEnd/>
+              </a14:hiddenLine>
+            </a:ext>
+          </a:extLst>
+        </p:spPr>
+        <p:txBody>
+          <a:bodyPr vert="horz" wrap="square" lIns="91440" tIns="45720" rIns="91440" bIns="45720" numCol="1" anchor="t" anchorCtr="0" compatLnSpc="1">
+            <a:prstTxWarp prst="textNoShape">
+              <a:avLst/>
+            </a:prstTxWarp>
+          </a:bodyPr>
+          <a:lstStyle/>
+          <a:p>
+            <a:endParaRPr lang="en-US"/>
+          </a:p>
+        </p:txBody>
+      </p:sp>
+      <p:sp>
+        <p:nvSpPr>
+          <p:cNvPr id="2" name="Title 1">
+            <a:extLst>
+              <a:ext uri="{FF2B5EF4-FFF2-40B4-BE49-F238E27FC236}">
+                <a16:creationId xmlns:a16="http://schemas.microsoft.com/office/drawing/2014/main" id="{C7160F62-AFFD-479F-B268-52AA632E7798}"/>
+              </a:ext>
+            </a:extLst>
+          </p:cNvPr>
+          <p:cNvSpPr>
+            <a:spLocks noGrp="1"/>
+          </p:cNvSpPr>
+          <p:nvPr>
+            <p:ph type="title"/>
+          </p:nvPr>
+        </p:nvSpPr>
+        <p:spPr>
+          <a:xfrm>
+            <a:off x="1039905" y="845387"/>
+            <a:ext cx="3470310" cy="1066689"/>
+          </a:xfrm>
+        </p:spPr>
+        <p:txBody>
+          <a:bodyPr anchor="b">
+            <a:normAutofit/>
+          </a:bodyPr>
+          <a:lstStyle/>
+          <a:p>
+            <a:pPr algn="l"/>
+            <a:r>
+              <a:rPr lang="en-GB" sz="2400"/>
+              <a:t>Trust Graphs</a:t>
+            </a:r>
+          </a:p>
+        </p:txBody>
+      </p:sp>
+      <p:sp>
+        <p:nvSpPr>
+          <p:cNvPr id="16" name="Content Placeholder 15">
+            <a:extLst>
+              <a:ext uri="{FF2B5EF4-FFF2-40B4-BE49-F238E27FC236}">
+                <a16:creationId xmlns:a16="http://schemas.microsoft.com/office/drawing/2014/main" id="{BF2153B8-A796-478E-8ADA-8CC5F6DCDF13}"/>
+              </a:ext>
+            </a:extLst>
+          </p:cNvPr>
+          <p:cNvSpPr>
+            <a:spLocks noGrp="1"/>
+          </p:cNvSpPr>
+          <p:nvPr>
+            <p:ph idx="1"/>
+          </p:nvPr>
+        </p:nvSpPr>
+        <p:spPr>
+          <a:xfrm>
+            <a:off x="1039905" y="2147862"/>
+            <a:ext cx="3405573" cy="3499563"/>
+          </a:xfrm>
+        </p:spPr>
+        <p:txBody>
+          <a:bodyPr anchor="t">
+            <a:normAutofit/>
+          </a:bodyPr>
+          <a:lstStyle/>
+          <a:p>
+            <a:r>
+              <a:rPr lang="en-US" sz="1600" dirty="0"/>
+              <a:t>Focuses on the three trust ratings available</a:t>
+            </a:r>
+          </a:p>
+          <a:p>
+            <a:pPr lvl="1"/>
+            <a:r>
+              <a:rPr lang="en-US" sz="1400" dirty="0"/>
+              <a:t>Police</a:t>
+            </a:r>
+          </a:p>
+          <a:p>
+            <a:pPr lvl="1"/>
+            <a:r>
+              <a:rPr lang="en-US" sz="1400" dirty="0"/>
+              <a:t>Political</a:t>
+            </a:r>
+          </a:p>
+          <a:p>
+            <a:pPr lvl="1"/>
+            <a:r>
+              <a:rPr lang="en-US" sz="1400" dirty="0"/>
+              <a:t>Legal</a:t>
+            </a:r>
+          </a:p>
+          <a:p>
+            <a:r>
+              <a:rPr lang="en-US" sz="1600" dirty="0"/>
+              <a:t>All data from 2013</a:t>
+            </a:r>
+          </a:p>
+          <a:p>
+            <a:r>
+              <a:rPr lang="en-US" sz="1600" dirty="0"/>
+              <a:t>Shows a positive </a:t>
+            </a:r>
+          </a:p>
+        </p:txBody>
+      </p:sp>
+      <p:pic>
+        <p:nvPicPr>
+          <p:cNvPr id="4" name="2019-12-04 13-48-34">
+            <a:hlinkClick r:id="" action="ppaction://media"/>
+            <a:extLst>
+              <a:ext uri="{FF2B5EF4-FFF2-40B4-BE49-F238E27FC236}">
+                <a16:creationId xmlns:a16="http://schemas.microsoft.com/office/drawing/2014/main" id="{59C9559E-1707-4400-91C0-A27494284183}"/>
+              </a:ext>
+            </a:extLst>
+          </p:cNvPr>
+          <p:cNvPicPr>
+            <a:picLocks noChangeAspect="1"/>
+          </p:cNvPicPr>
+          <p:nvPr>
+            <a:videoFile r:link="rId1"/>
+            <p:extLst>
+              <p:ext uri="{DAA4B4D4-6D71-4841-9C94-3DE7FCFB9230}">
+                <p14:media xmlns:p14="http://schemas.microsoft.com/office/powerpoint/2010/main" r:embed="rId2">
+                  <p14:trim st="2000" end="5067"/>
+                </p14:media>
+              </p:ext>
+            </p:extLst>
+          </p:nvPr>
+        </p:nvPicPr>
+        <p:blipFill>
+          <a:blip r:embed="rId5"/>
+          <a:stretch>
+            <a:fillRect/>
+          </a:stretch>
+        </p:blipFill>
+        <p:spPr>
+          <a:xfrm>
+            <a:off x="5387351" y="1701040"/>
+            <a:ext cx="6161183" cy="3465665"/>
+          </a:xfrm>
+          <a:prstGeom prst="rect">
+            <a:avLst/>
+          </a:prstGeom>
+        </p:spPr>
+      </p:pic>
+    </p:spTree>
+    <p:extLst>
+      <p:ext uri="{BB962C8B-B14F-4D97-AF65-F5344CB8AC3E}">
+        <p14:creationId xmlns:p14="http://schemas.microsoft.com/office/powerpoint/2010/main" val="3879322090"/>
+      </p:ext>
+    </p:extLst>
+  </p:cSld>
+  <p:clrMapOvr>
+    <a:masterClrMapping/>
+  </p:clrMapOvr>
+  <p:timing>
+    <p:tnLst>
+      <p:par>
+        <p:cTn id="1" dur="indefinite" restart="never" nodeType="tmRoot">
+          <p:childTnLst>
+            <p:seq concurrent="1" nextAc="seek">
+              <p:cTn id="2" dur="indefinite" nodeType="mainSeq">
+                <p:childTnLst>
+                  <p:par>
+                    <p:cTn id="3" fill="hold">
+                      <p:stCondLst>
+                        <p:cond delay="indefinite"/>
+                        <p:cond evt="onBegin" delay="0">
+                          <p:tn val="2"/>
+                        </p:cond>
+                      </p:stCondLst>
+                      <p:childTnLst>
+                        <p:par>
+                          <p:cTn id="4" fill="hold">
+                            <p:stCondLst>
+                              <p:cond delay="0"/>
+                            </p:stCondLst>
+                            <p:childTnLst>
+                              <p:par>
+                                <p:cTn id="5" presetID="1" presetClass="mediacall" presetSubtype="0" fill="hold" nodeType="afterEffect">
+                                  <p:stCondLst>
+                                    <p:cond delay="0"/>
+                                  </p:stCondLst>
+                                  <p:childTnLst>
+                                    <p:cmd type="call" cmd="playFrom(0.0)">
+                                      <p:cBhvr>
+                                        <p:cTn id="6" dur="33000" fill="hold"/>
+                                        <p:tgtEl>
+                                          <p:spTgt spid="4"/>
+                                        </p:tgtEl>
+                                      </p:cBhvr>
+                                    </p:cmd>
+                                  </p:childTnLst>
+                                </p:cTn>
+                              </p:par>
+                            </p:childTnLst>
+                          </p:cTn>
+                        </p:par>
+                      </p:childTnLst>
+                    </p:cTn>
+                  </p:par>
+                </p:childTnLst>
+              </p:cTn>
+              <p:prevCondLst>
+                <p:cond evt="onPrev" delay="0">
+                  <p:tgtEl>
+                    <p:sldTgt/>
+                  </p:tgtEl>
+                </p:cond>
+              </p:prevCondLst>
+              <p:nextCondLst>
+                <p:cond evt="onNext" delay="0">
+                  <p:tgtEl>
+                    <p:sldTgt/>
+                  </p:tgtEl>
+                </p:cond>
+              </p:nextCondLst>
+            </p:seq>
+            <p:video>
+              <p:cMediaNode vol="80000" mute="1">
+                <p:cTn id="7" repeatCount="indefinite" fill="hold" display="0">
+                  <p:stCondLst>
+                    <p:cond delay="indefinite"/>
+                  </p:stCondLst>
+                </p:cTn>
+                <p:tgtEl>
+                  <p:spTgt spid="4"/>
+                </p:tgtEl>
+              </p:cMediaNode>
+            </p:video>
+            <p:seq concurrent="1" nextAc="seek">
+              <p:cTn id="8" restart="whenNotActive" fill="hold" evtFilter="cancelBubble" nodeType="interactiveSeq">
+                <p:stCondLst>
+                  <p:cond evt="onClick" delay="0">
+                    <p:tgtEl>
+                      <p:spTgt spid="4"/>
+                    </p:tgtEl>
+                  </p:cond>
+                </p:stCondLst>
+                <p:endSync evt="end" delay="0">
+                  <p:rtn val="all"/>
+                </p:endSync>
+                <p:childTnLst>
+                  <p:par>
+                    <p:cTn id="9" fill="hold">
+                      <p:stCondLst>
+                        <p:cond delay="0"/>
+                      </p:stCondLst>
+                      <p:childTnLst>
+                        <p:par>
+                          <p:cTn id="10" fill="hold">
+                            <p:stCondLst>
+                              <p:cond delay="0"/>
+                            </p:stCondLst>
+                            <p:childTnLst>
+                              <p:par>
+                                <p:cTn id="11" presetID="2" presetClass="mediacall" presetSubtype="0" fill="hold" nodeType="clickEffect">
+                                  <p:stCondLst>
+                                    <p:cond delay="0"/>
+                                  </p:stCondLst>
+                                  <p:childTnLst>
+                                    <p:cmd type="call" cmd="togglePause">
+                                      <p:cBhvr>
+                                        <p:cTn id="12" dur="1" fill="hold"/>
+                                        <p:tgtEl>
+                                          <p:spTgt spid="4"/>
+                                        </p:tgtEl>
+                                      </p:cBhvr>
+                                    </p:cmd>
+                                  </p:childTnLst>
+                                </p:cTn>
+                              </p:par>
+                            </p:childTnLst>
+                          </p:cTn>
+                        </p:par>
+                      </p:childTnLst>
+                    </p:cTn>
+                  </p:par>
+                </p:childTnLst>
+              </p:cTn>
+              <p:nextCondLst>
+                <p:cond evt="onClick" delay="0">
+                  <p:tgtEl>
+                    <p:spTgt spid="4"/>
+                  </p:tgtEl>
+                </p:cond>
+              </p:nextCondLst>
+            </p:seq>
+          </p:childTnLst>
+        </p:cTn>
+      </p:par>
+    </p:tnLst>
+  </p:timing>
+</p:sld>
+</file>
+
+<file path=ppt/slides/slide5.xml><?xml version="1.0" encoding="utf-8"?>
+<p:sld xmlns:a="http://schemas.openxmlformats.org/drawingml/2006/main" xmlns:r="http://schemas.openxmlformats.org/officeDocument/2006/relationships" xmlns:p="http://schemas.openxmlformats.org/presentationml/2006/main">
+  <p:cSld>
+    <p:bg>
+      <p:bgPr>
+        <a:solidFill>
+          <a:schemeClr val="bg1"/>
+        </a:solidFill>
+        <a:effectLst/>
+      </p:bgPr>
+    </p:bg>
+    <p:spTree>
+      <p:nvGrpSpPr>
+        <p:cNvPr id="1" name=""/>
+        <p:cNvGrpSpPr/>
+        <p:nvPr/>
+      </p:nvGrpSpPr>
+      <p:grpSpPr>
+        <a:xfrm>
+          <a:off x="0" y="0"/>
+          <a:ext cx="0" cy="0"/>
+          <a:chOff x="0" y="0"/>
+          <a:chExt cx="0" cy="0"/>
+        </a:xfrm>
+      </p:grpSpPr>
+      <p:sp>
+        <p:nvSpPr>
+          <p:cNvPr id="8" name="Rectangle 7">
+            <a:extLst>
+              <a:ext uri="{FF2B5EF4-FFF2-40B4-BE49-F238E27FC236}">
+                <a16:creationId xmlns:a16="http://schemas.microsoft.com/office/drawing/2014/main" id="{1C3D9BD5-A493-4B97-963D-60135D533822}"/>
+              </a:ext>
+              <a:ext uri="{C183D7F6-B498-43B3-948B-1728B52AA6E4}">
+                <adec:decorative xmlns:adec="http://schemas.microsoft.com/office/drawing/2017/decorative" val="1"/>
+              </a:ext>
+            </a:extLst>
+          </p:cNvPr>
+          <p:cNvSpPr>
+            <a:spLocks noGrp="1" noRot="1" noChangeAspect="1" noMove="1" noResize="1" noEditPoints="1" noAdjustHandles="1" noChangeArrowheads="1" noChangeShapeType="1" noTextEdit="1"/>
+          </p:cNvSpPr>
+          <p:nvPr>
+            <p:extLst>
+              <p:ext uri="{386F3935-93C4-4BCD-93E2-E3B085C9AB24}">
+                <p16:designElem xmlns:p16="http://schemas.microsoft.com/office/powerpoint/2015/main" val="1"/>
+              </p:ext>
+            </p:extLst>
+          </p:nvPr>
+        </p:nvSpPr>
+        <p:spPr>
+          <a:xfrm>
+            <a:off x="0" y="0"/>
+            <a:ext cx="12192000" cy="6858000"/>
+          </a:xfrm>
+          <a:prstGeom prst="rect">
+            <a:avLst/>
+          </a:prstGeom>
+          <a:ln>
+            <a:noFill/>
+          </a:ln>
+        </p:spPr>
+        <p:style>
+          <a:lnRef idx="2">
+            <a:schemeClr val="accent1">
+              <a:shade val="50000"/>
+            </a:schemeClr>
+          </a:lnRef>
+          <a:fillRef idx="1003">
+            <a:schemeClr val="dk2"/>
+          </a:fillRef>
+          <a:effectRef idx="0">
+            <a:schemeClr val="accent1"/>
+          </a:effectRef>
+          <a:fontRef idx="minor">
+            <a:schemeClr val="lt1"/>
+          </a:fontRef>
+        </p:style>
+        <p:txBody>
+          <a:bodyPr rtlCol="0" anchor="ctr"/>
+          <a:lstStyle/>
+          <a:p>
+            <a:pPr algn="ctr"/>
+            <a:endParaRPr lang="en-US"/>
+          </a:p>
+        </p:txBody>
+      </p:sp>
+      <p:sp useBgFill="1">
+        <p:nvSpPr>
+          <p:cNvPr id="10" name="Rectangle 9">
+            <a:extLst>
+              <a:ext uri="{FF2B5EF4-FFF2-40B4-BE49-F238E27FC236}">
+                <a16:creationId xmlns:a16="http://schemas.microsoft.com/office/drawing/2014/main" id="{1F759AF4-E342-4E60-8A32-C44A328F2F42}"/>
+              </a:ext>
+              <a:ext uri="{C183D7F6-B498-43B3-948B-1728B52AA6E4}">
+                <adec:decorative xmlns:adec="http://schemas.microsoft.com/office/drawing/2017/decorative" val="1"/>
+              </a:ext>
+            </a:extLst>
+          </p:cNvPr>
+          <p:cNvSpPr>
+            <a:spLocks noGrp="1" noRot="1" noChangeAspect="1" noMove="1" noResize="1" noEditPoints="1" noAdjustHandles="1" noChangeArrowheads="1" noChangeShapeType="1" noTextEdit="1"/>
+          </p:cNvSpPr>
+          <p:nvPr>
+            <p:extLst>
+              <p:ext uri="{386F3935-93C4-4BCD-93E2-E3B085C9AB24}">
+                <p16:designElem xmlns:p16="http://schemas.microsoft.com/office/powerpoint/2015/main" val="1"/>
+              </p:ext>
+            </p:extLst>
+          </p:nvPr>
+        </p:nvSpPr>
+        <p:spPr bwMode="ltGray">
+          <a:xfrm>
+            <a:off x="321564" y="320040"/>
+            <a:ext cx="11548872" cy="6217920"/>
+          </a:xfrm>
+          <a:prstGeom prst="rect">
+            <a:avLst/>
+          </a:prstGeom>
+          <a:ln w="15875" cap="sq" cmpd="sng">
+            <a:noFill/>
+            <a:miter lim="800000"/>
+          </a:ln>
+        </p:spPr>
+        <p:style>
+          <a:lnRef idx="2">
+            <a:schemeClr val="accent1">
+              <a:shade val="50000"/>
+            </a:schemeClr>
+          </a:lnRef>
+          <a:fillRef idx="1">
+            <a:schemeClr val="accent1"/>
+          </a:fillRef>
+          <a:effectRef idx="0">
+            <a:schemeClr val="accent1"/>
+          </a:effectRef>
+          <a:fontRef idx="minor">
+            <a:schemeClr val="lt1"/>
+          </a:fontRef>
+        </p:style>
+        <p:txBody>
+          <a:bodyPr rtlCol="0" anchor="ctr"/>
+          <a:lstStyle/>
+          <a:p>
+            <a:pPr algn="ctr"/>
+            <a:endParaRPr lang="en-US"/>
+          </a:p>
+        </p:txBody>
+      </p:sp>
+      <p:sp>
+        <p:nvSpPr>
+          <p:cNvPr id="2" name="Title 1">
+            <a:extLst>
+              <a:ext uri="{FF2B5EF4-FFF2-40B4-BE49-F238E27FC236}">
+                <a16:creationId xmlns:a16="http://schemas.microsoft.com/office/drawing/2014/main" id="{A9CF7386-C6BD-4939-AB19-FF4442B079C3}"/>
+              </a:ext>
+            </a:extLst>
+          </p:cNvPr>
+          <p:cNvSpPr>
+            <a:spLocks noGrp="1"/>
+          </p:cNvSpPr>
+          <p:nvPr>
+            <p:ph type="title"/>
+          </p:nvPr>
+        </p:nvSpPr>
+        <p:spPr>
+          <a:xfrm>
+            <a:off x="924443" y="1023257"/>
+            <a:ext cx="3732902" cy="4570457"/>
+          </a:xfrm>
+          <a:effectLst/>
+        </p:spPr>
+        <p:txBody>
+          <a:bodyPr>
+            <a:normAutofit/>
+          </a:bodyPr>
+          <a:lstStyle/>
+          <a:p>
+            <a:pPr algn="l"/>
+            <a:r>
+              <a:rPr lang="en-GB" dirty="0"/>
+              <a:t>Conclusion</a:t>
+            </a:r>
+          </a:p>
+        </p:txBody>
+      </p:sp>
+      <p:cxnSp>
+        <p:nvCxnSpPr>
+          <p:cNvPr id="12" name="Straight Connector 11">
+            <a:extLst>
+              <a:ext uri="{FF2B5EF4-FFF2-40B4-BE49-F238E27FC236}">
+                <a16:creationId xmlns:a16="http://schemas.microsoft.com/office/drawing/2014/main" id="{A49B2805-6469-407A-A68A-BB85AC8A8596}"/>
+              </a:ext>
+              <a:ext uri="{C183D7F6-B498-43B3-948B-1728B52AA6E4}">
+                <adec:decorative xmlns:adec="http://schemas.microsoft.com/office/drawing/2017/decorative" val="1"/>
+              </a:ext>
+            </a:extLst>
+          </p:cNvPr>
+          <p:cNvCxnSpPr>
+            <a:cxnSpLocks noGrp="1" noRot="1" noChangeAspect="1" noMove="1" noResize="1" noEditPoints="1" noAdjustHandles="1" noChangeArrowheads="1" noChangeShapeType="1"/>
+          </p:cNvCxnSpPr>
+          <p:nvPr>
+            <p:extLst>
+              <p:ext uri="{386F3935-93C4-4BCD-93E2-E3B085C9AB24}">
+                <p16:designElem xmlns:p16="http://schemas.microsoft.com/office/powerpoint/2015/main" val="1"/>
+              </p:ext>
+            </p:extLst>
+          </p:nvPr>
+        </p:nvCxnSpPr>
+        <p:spPr>
+          <a:xfrm>
+            <a:off x="4968371" y="2057399"/>
+            <a:ext cx="0" cy="2743200"/>
+          </a:xfrm>
+          <a:prstGeom prst="line">
+            <a:avLst/>
+          </a:prstGeom>
+          <a:ln w="19050">
+            <a:solidFill>
+              <a:schemeClr val="accent1"/>
+            </a:solidFill>
+          </a:ln>
+        </p:spPr>
+        <p:style>
+          <a:lnRef idx="1">
+            <a:schemeClr val="accent1"/>
+          </a:lnRef>
+          <a:fillRef idx="0">
+            <a:schemeClr val="accent1"/>
+          </a:fillRef>
+          <a:effectRef idx="0">
+            <a:schemeClr val="accent1"/>
+          </a:effectRef>
+          <a:fontRef idx="minor">
+            <a:schemeClr val="tx1"/>
+          </a:fontRef>
+        </p:style>
+      </p:cxnSp>
+      <p:sp>
+        <p:nvSpPr>
+          <p:cNvPr id="3" name="Content Placeholder 2">
+            <a:extLst>
+              <a:ext uri="{FF2B5EF4-FFF2-40B4-BE49-F238E27FC236}">
+                <a16:creationId xmlns:a16="http://schemas.microsoft.com/office/drawing/2014/main" id="{3FD5AFFE-5AD3-4734-B407-91C80BD6B4E1}"/>
+              </a:ext>
+            </a:extLst>
+          </p:cNvPr>
+          <p:cNvSpPr>
+            <a:spLocks noGrp="1"/>
+          </p:cNvSpPr>
+          <p:nvPr>
+            <p:ph idx="1"/>
+          </p:nvPr>
+        </p:nvSpPr>
+        <p:spPr>
+          <a:xfrm>
+            <a:off x="5252560" y="1023257"/>
+            <a:ext cx="6025645" cy="4570457"/>
+          </a:xfrm>
+          <a:effectLst/>
+        </p:spPr>
+        <p:txBody>
+          <a:bodyPr anchor="ctr">
+            <a:normAutofit/>
+          </a:bodyPr>
+          <a:lstStyle/>
+          <a:p>
+            <a:r>
+              <a:rPr lang="en-GB" dirty="0"/>
+              <a:t>We can conclude that the dataset is relative to the country</a:t>
+            </a:r>
+          </a:p>
+          <a:p>
+            <a:r>
+              <a:rPr lang="en-GB" dirty="0"/>
+              <a:t>We believe that each participant was rating relative to their country not other European countries.</a:t>
+            </a:r>
+          </a:p>
+        </p:txBody>
+      </p:sp>
+    </p:spTree>
+    <p:extLst>
+      <p:ext uri="{BB962C8B-B14F-4D97-AF65-F5344CB8AC3E}">
+        <p14:creationId xmlns:p14="http://schemas.microsoft.com/office/powerpoint/2010/main" val="4143311138"/>
+      </p:ext>
+    </p:extLst>
+  </p:cSld>
+  <p:clrMapOvr>
+    <a:overrideClrMapping bg1="lt1" tx1="dk1" bg2="lt2" tx2="dk2" accent1="accent1" accent2="accent2" accent3="accent3" accent4="accent4" accent5="accent5" accent6="accent6" hlink="hlink" folHlink="folHlink"/>
+  </p:clrMapOvr>
+</p:sld>
+</file>
+
 <file path=ppt/theme/theme1.xml><?xml version="1.0" encoding="utf-8"?>
 <a:theme xmlns:a="http://schemas.openxmlformats.org/drawingml/2006/main" name="SlateVTI">
   <a:themeElements>

</xml_diff>